<commit_message>
modified previous documents according to our meeting. added appropriate logos. added reservation report and attendance roster
</commit_message>
<xml_diff>
--- a/ActiveNet Trainer/Courses/ActiveNet Orientation - Customers/Customer Modification.pptx
+++ b/ActiveNet Trainer/Courses/ActiveNet Orientation - Customers/Customer Modification.pptx
@@ -258,7 +258,7 @@
           <a:p>
             <a:fld id="{8472C7DE-940F-F84D-87FC-CB6C77FFB87A}" type="datetimeFigureOut">
               <a:rPr lang="en-US" smtClean="0"/>
-              <a:t>12/22/16</a:t>
+              <a:t>1/20/17</a:t>
             </a:fld>
             <a:endParaRPr lang="en-US"/>
           </a:p>
@@ -428,7 +428,7 @@
           <a:p>
             <a:fld id="{8472C7DE-940F-F84D-87FC-CB6C77FFB87A}" type="datetimeFigureOut">
               <a:rPr lang="en-US" smtClean="0"/>
-              <a:t>12/22/16</a:t>
+              <a:t>1/20/17</a:t>
             </a:fld>
             <a:endParaRPr lang="en-US"/>
           </a:p>
@@ -608,7 +608,7 @@
           <a:p>
             <a:fld id="{8472C7DE-940F-F84D-87FC-CB6C77FFB87A}" type="datetimeFigureOut">
               <a:rPr lang="en-US" smtClean="0"/>
-              <a:t>12/22/16</a:t>
+              <a:t>1/20/17</a:t>
             </a:fld>
             <a:endParaRPr lang="en-US"/>
           </a:p>
@@ -778,7 +778,7 @@
           <a:p>
             <a:fld id="{8472C7DE-940F-F84D-87FC-CB6C77FFB87A}" type="datetimeFigureOut">
               <a:rPr lang="en-US" smtClean="0"/>
-              <a:t>12/22/16</a:t>
+              <a:t>1/20/17</a:t>
             </a:fld>
             <a:endParaRPr lang="en-US"/>
           </a:p>
@@ -1022,7 +1022,7 @@
           <a:p>
             <a:fld id="{8472C7DE-940F-F84D-87FC-CB6C77FFB87A}" type="datetimeFigureOut">
               <a:rPr lang="en-US" smtClean="0"/>
-              <a:t>12/22/16</a:t>
+              <a:t>1/20/17</a:t>
             </a:fld>
             <a:endParaRPr lang="en-US"/>
           </a:p>
@@ -1254,7 +1254,7 @@
           <a:p>
             <a:fld id="{8472C7DE-940F-F84D-87FC-CB6C77FFB87A}" type="datetimeFigureOut">
               <a:rPr lang="en-US" smtClean="0"/>
-              <a:t>12/22/16</a:t>
+              <a:t>1/20/17</a:t>
             </a:fld>
             <a:endParaRPr lang="en-US"/>
           </a:p>
@@ -1621,7 +1621,7 @@
           <a:p>
             <a:fld id="{8472C7DE-940F-F84D-87FC-CB6C77FFB87A}" type="datetimeFigureOut">
               <a:rPr lang="en-US" smtClean="0"/>
-              <a:t>12/22/16</a:t>
+              <a:t>1/20/17</a:t>
             </a:fld>
             <a:endParaRPr lang="en-US"/>
           </a:p>
@@ -1739,7 +1739,7 @@
           <a:p>
             <a:fld id="{8472C7DE-940F-F84D-87FC-CB6C77FFB87A}" type="datetimeFigureOut">
               <a:rPr lang="en-US" smtClean="0"/>
-              <a:t>12/22/16</a:t>
+              <a:t>1/20/17</a:t>
             </a:fld>
             <a:endParaRPr lang="en-US"/>
           </a:p>
@@ -1834,7 +1834,7 @@
           <a:p>
             <a:fld id="{8472C7DE-940F-F84D-87FC-CB6C77FFB87A}" type="datetimeFigureOut">
               <a:rPr lang="en-US" smtClean="0"/>
-              <a:t>12/22/16</a:t>
+              <a:t>1/20/17</a:t>
             </a:fld>
             <a:endParaRPr lang="en-US"/>
           </a:p>
@@ -2111,7 +2111,7 @@
           <a:p>
             <a:fld id="{8472C7DE-940F-F84D-87FC-CB6C77FFB87A}" type="datetimeFigureOut">
               <a:rPr lang="en-US" smtClean="0"/>
-              <a:t>12/22/16</a:t>
+              <a:t>1/20/17</a:t>
             </a:fld>
             <a:endParaRPr lang="en-US"/>
           </a:p>
@@ -2368,7 +2368,7 @@
           <a:p>
             <a:fld id="{8472C7DE-940F-F84D-87FC-CB6C77FFB87A}" type="datetimeFigureOut">
               <a:rPr lang="en-US" smtClean="0"/>
-              <a:t>12/22/16</a:t>
+              <a:t>1/20/17</a:t>
             </a:fld>
             <a:endParaRPr lang="en-US"/>
           </a:p>
@@ -2581,7 +2581,7 @@
           <a:p>
             <a:fld id="{8472C7DE-940F-F84D-87FC-CB6C77FFB87A}" type="datetimeFigureOut">
               <a:rPr lang="en-US" smtClean="0"/>
-              <a:t>12/22/16</a:t>
+              <a:t>1/20/17</a:t>
             </a:fld>
             <a:endParaRPr lang="en-US"/>
           </a:p>
@@ -3056,10 +3056,17 @@
           <a:p>
             <a:pPr algn="ctr"/>
             <a:r>
-              <a:rPr lang="en-US" sz="3200" dirty="0" smtClean="0"/>
-              <a:t>Before We Continue</a:t>
-            </a:r>
-            <a:endParaRPr lang="en-US" sz="3200" dirty="0"/>
+              <a:rPr lang="en-US" sz="2800" b="1" dirty="0" smtClean="0"/>
+              <a:t>Customer</a:t>
+            </a:r>
+          </a:p>
+          <a:p>
+            <a:pPr algn="ctr"/>
+            <a:r>
+              <a:rPr lang="en-US" sz="2800" b="1" dirty="0" smtClean="0"/>
+              <a:t>Modification</a:t>
+            </a:r>
+            <a:endParaRPr lang="en-US" sz="2800" b="1" dirty="0"/>
           </a:p>
         </p:txBody>
       </p:sp>
@@ -5141,15 +5148,7 @@
                   <a:schemeClr val="bg1"/>
                 </a:solidFill>
               </a:rPr>
-              <a:t>To finish, return to </a:t>
-            </a:r>
-            <a:r>
-              <a:rPr lang="en-US" sz="2800" i="1" dirty="0" smtClean="0">
-                <a:solidFill>
-                  <a:schemeClr val="bg1"/>
-                </a:solidFill>
-              </a:rPr>
-              <a:t>the </a:t>
+              <a:t>To finish, return to the </a:t>
             </a:r>
             <a:r>
               <a:rPr lang="en-US" sz="2800" b="1" i="1" dirty="0" smtClean="0">

</xml_diff>